<commit_message>
Added names to merged code
</commit_message>
<xml_diff>
--- a/Data_Throne_Randie.pptx
+++ b/Data_Throne_Randie.pptx
@@ -8,15 +8,15 @@
     <p:notesMasterId r:id="rId11"/>
   </p:notesMasterIdLst>
   <p:sldIdLst>
-    <p:sldId id="256" r:id="rId2"/>
-    <p:sldId id="261" r:id="rId3"/>
-    <p:sldId id="263" r:id="rId4"/>
-    <p:sldId id="262" r:id="rId5"/>
-    <p:sldId id="268" r:id="rId6"/>
-    <p:sldId id="267" r:id="rId7"/>
-    <p:sldId id="264" r:id="rId8"/>
-    <p:sldId id="269" r:id="rId9"/>
-    <p:sldId id="259" r:id="rId10"/>
+    <p:sldId id="261" r:id="rId2"/>
+    <p:sldId id="263" r:id="rId3"/>
+    <p:sldId id="262" r:id="rId4"/>
+    <p:sldId id="268" r:id="rId5"/>
+    <p:sldId id="267" r:id="rId6"/>
+    <p:sldId id="264" r:id="rId7"/>
+    <p:sldId id="269" r:id="rId8"/>
+    <p:sldId id="259" r:id="rId9"/>
+    <p:sldId id="270" r:id="rId10"/>
   </p:sldIdLst>
   <p:sldSz cx="12192000" cy="6858000"/>
   <p:notesSz cx="6858000" cy="9144000"/>
@@ -119,6 +119,9 @@
     <p:ext uri="{EFAFB233-063F-42B5-8137-9DF3F51BA10A}">
       <p15:sldGuideLst xmlns:p15="http://schemas.microsoft.com/office/powerpoint/2012/main"/>
     </p:ext>
+    <p:ext uri="{2D200454-40CA-4A62-9FC3-DE9A4176ACB9}">
+      <p15:notesGuideLst xmlns:p15="http://schemas.microsoft.com/office/powerpoint/2012/main"/>
+    </p:ext>
   </p:extLst>
 </p:presentation>
 </file>
@@ -205,7 +208,7 @@
           <a:p>
             <a:fld id="{A16717A9-5C19-4FB3-97BC-BE7BB9E0A17A}" type="datetimeFigureOut">
               <a:rPr lang="en-US" smtClean="0"/>
-              <a:t>11/13/2022</a:t>
+              <a:t>11/14/2022</a:t>
             </a:fld>
             <a:endParaRPr lang="en-US"/>
           </a:p>
@@ -511,12 +514,125 @@
             <p:ph type="body" idx="1"/>
           </p:nvPr>
         </p:nvSpPr>
-        <p:spPr/>
+        <p:spPr>
+          <a:xfrm>
+            <a:off x="685800" y="4400550"/>
+            <a:ext cx="5486400" cy="4464050"/>
+          </a:xfrm>
+        </p:spPr>
         <p:txBody>
           <a:bodyPr/>
           <a:lstStyle/>
           <a:p>
-            <a:endParaRPr lang="en-US"/>
+            <a:r>
+              <a:rPr lang="en-US" sz="1050" b="0" i="0" dirty="0">
+                <a:effectLst/>
+                <a:latin typeface="-apple-system"/>
+              </a:rPr>
+              <a:t>With this database I researched the top 3 deadliest areas of this world, the top 5 killers in each of those areas, and also the top 5 deaths by allegiance in each of the 3 areas. To clarify, I wanted to know what allegiance it was most dangerous for in each of those areas. If you’ve never seen this show and plan to, turn your volume all the way down right now. Many spoilers ahead!</a:t>
+            </a:r>
+          </a:p>
+          <a:p>
+            <a:endParaRPr lang="en-US" sz="1050" dirty="0">
+              <a:latin typeface="-apple-system"/>
+            </a:endParaRPr>
+          </a:p>
+          <a:p>
+            <a:r>
+              <a:rPr lang="en-US" sz="1050" b="0" i="0" dirty="0">
+                <a:effectLst/>
+                <a:latin typeface="-apple-system"/>
+              </a:rPr>
+              <a:t>You may be wondering as I did, who in their right mind took the time to count every single one of the alleged 6,887 deaths over the course of 8 seasons of this show… This insane and wonderful individual is Shelly Tan, a graphics reporter specializing in data visualization, illustrations and pop culture. </a:t>
+            </a:r>
+            <a:r>
+              <a:rPr lang="en-US" sz="1050" dirty="0">
+                <a:latin typeface="-apple-system"/>
+              </a:rPr>
+              <a:t>I wanted to be sure to thank and properly credit her for her efforts.</a:t>
+            </a:r>
+            <a:endParaRPr lang="en-US" sz="1050" b="0" i="0" dirty="0">
+              <a:effectLst/>
+              <a:latin typeface="-apple-system"/>
+            </a:endParaRPr>
+          </a:p>
+          <a:p>
+            <a:endParaRPr lang="en-US" sz="1050" dirty="0">
+              <a:solidFill>
+                <a:srgbClr val="C9D1D9"/>
+              </a:solidFill>
+              <a:latin typeface="-apple-system"/>
+            </a:endParaRPr>
+          </a:p>
+          <a:p>
+            <a:r>
+              <a:rPr lang="en-US" sz="1050" dirty="0"/>
+              <a:t>With a dataset like this, there are so many variables, that a methodology must be established to be able to research and get the results that we seek. Some of the decisions that were made to create this dataset include:</a:t>
+            </a:r>
+          </a:p>
+          <a:p>
+            <a:pPr marL="171450" indent="-171450">
+              <a:buFontTx/>
+              <a:buChar char="-"/>
+            </a:pPr>
+            <a:r>
+              <a:rPr lang="en-US" sz="1050" dirty="0"/>
+              <a:t>A death is only counted if the character is killed on-screen. UNLESS, the character dies off-screen but the death is confirmed or assumed due to imminent death while on screen. The exception would be prominent off-screen deaths, and prominence is determined mostly by importance to the plot.</a:t>
+            </a:r>
+          </a:p>
+          <a:p>
+            <a:pPr marL="171450" indent="-171450">
+              <a:buFontTx/>
+              <a:buChar char="-"/>
+            </a:pPr>
+            <a:endParaRPr lang="en-US" sz="1050" dirty="0"/>
+          </a:p>
+          <a:p>
+            <a:pPr marL="171450" indent="-171450">
+              <a:buFontTx/>
+              <a:buChar char="-"/>
+            </a:pPr>
+            <a:r>
+              <a:rPr lang="en-US" sz="1050" dirty="0"/>
+              <a:t>Another decision that was made for this dataset was that if a character orders the death of another, the character who does the direct killing receives credit; not the one who orders the kill. But for cases where the direct killer is unidentifiable, like when Cersei Lannister uses the caches of wildfire to blow up the Great Sept of </a:t>
+            </a:r>
+            <a:r>
+              <a:rPr lang="en-US" sz="1050" dirty="0" err="1"/>
+              <a:t>Baelor</a:t>
+            </a:r>
+            <a:r>
+              <a:rPr lang="en-US" sz="1050" dirty="0"/>
+              <a:t>, the order giver receives the credit.</a:t>
+            </a:r>
+          </a:p>
+          <a:p>
+            <a:endParaRPr lang="en-US" sz="1050" dirty="0"/>
+          </a:p>
+          <a:p>
+            <a:r>
+              <a:rPr lang="en-US" sz="1050" dirty="0"/>
+              <a:t>It is also noted that f</a:t>
+            </a:r>
+            <a:r>
+              <a:rPr lang="en-US" sz="1050" b="0" i="0" dirty="0">
+                <a:effectLst/>
+                <a:latin typeface="-apple-system"/>
+              </a:rPr>
+              <a:t>or big battles such as the Battle of the Bastards, it is often unclear which side a </a:t>
+            </a:r>
+            <a:r>
+              <a:rPr lang="en-US" sz="1050" dirty="0">
+                <a:latin typeface="-apple-system"/>
+              </a:rPr>
+              <a:t>soldier being killed </a:t>
+            </a:r>
+            <a:r>
+              <a:rPr lang="en-US" sz="1050" b="0" i="0" dirty="0">
+                <a:effectLst/>
+                <a:latin typeface="-apple-system"/>
+              </a:rPr>
+              <a:t>belongs to. Educated guesses were made based on the details like the shape of a helmet a soldier is wearing, along with other things like sigils that can be seen on armor.</a:t>
+            </a:r>
           </a:p>
         </p:txBody>
       </p:sp>
@@ -546,7 +662,7 @@
     </p:spTree>
     <p:extLst>
       <p:ext uri="{BB962C8B-B14F-4D97-AF65-F5344CB8AC3E}">
-        <p14:creationId xmlns:p14="http://schemas.microsoft.com/office/powerpoint/2010/main" val="497822562"/>
+        <p14:creationId xmlns:p14="http://schemas.microsoft.com/office/powerpoint/2010/main" val="2639276980"/>
       </p:ext>
     </p:extLst>
   </p:cSld>
@@ -595,125 +711,18 @@
             <p:ph type="body" idx="1"/>
           </p:nvPr>
         </p:nvSpPr>
-        <p:spPr>
-          <a:xfrm>
-            <a:off x="685800" y="4400550"/>
-            <a:ext cx="5486400" cy="4464050"/>
-          </a:xfrm>
-        </p:spPr>
+        <p:spPr/>
         <p:txBody>
           <a:bodyPr/>
           <a:lstStyle/>
           <a:p>
-            <a:r>
-              <a:rPr lang="en-US" sz="1050" b="0" i="0" dirty="0">
-                <a:effectLst/>
-                <a:latin typeface="-apple-system"/>
-              </a:rPr>
-              <a:t>With this database I researched the top 3 deadliest areas of this world, the top 5 killers in each of those areas, and also the top 5 deaths by allegiance in each of the 3 areas. To clarify, I wanted to know what allegiance it was most dangerous for in each of those areas. If you’ve never seen this show and plan to, turn your volume all the way down right now. Many spoilers ahead!</a:t>
-            </a:r>
-          </a:p>
-          <a:p>
-            <a:endParaRPr lang="en-US" sz="1050" dirty="0">
-              <a:latin typeface="-apple-system"/>
-            </a:endParaRPr>
-          </a:p>
-          <a:p>
-            <a:r>
-              <a:rPr lang="en-US" sz="1050" b="0" i="0" dirty="0">
-                <a:effectLst/>
-                <a:latin typeface="-apple-system"/>
-              </a:rPr>
-              <a:t>You may be wondering as I did, who in their right mind took the time to count every single one of the alleged 6,887 deaths over the course of 8 seasons of this show… This insane and wonderful individual is Shelly Tan, a graphics reporter specializing in data visualization, illustrations and pop culture. </a:t>
-            </a:r>
-            <a:r>
-              <a:rPr lang="en-US" sz="1050" dirty="0">
-                <a:latin typeface="-apple-system"/>
-              </a:rPr>
-              <a:t>I wanted to be sure to thank and properly credit her for her efforts.</a:t>
-            </a:r>
-            <a:endParaRPr lang="en-US" sz="1050" b="0" i="0" dirty="0">
-              <a:effectLst/>
-              <a:latin typeface="-apple-system"/>
-            </a:endParaRPr>
-          </a:p>
-          <a:p>
-            <a:endParaRPr lang="en-US" sz="1050" dirty="0">
-              <a:solidFill>
-                <a:srgbClr val="C9D1D9"/>
-              </a:solidFill>
-              <a:latin typeface="-apple-system"/>
-            </a:endParaRPr>
-          </a:p>
-          <a:p>
-            <a:r>
-              <a:rPr lang="en-US" sz="1050" dirty="0"/>
-              <a:t>With a dataset like this, there are so many variables, that a methodology must be established to be able to research and get the results that we seek. Some of the decisions that were made to create this dataset include:</a:t>
-            </a:r>
-          </a:p>
-          <a:p>
-            <a:pPr marL="171450" indent="-171450">
-              <a:buFontTx/>
-              <a:buChar char="-"/>
-            </a:pPr>
-            <a:r>
-              <a:rPr lang="en-US" sz="1050" dirty="0"/>
-              <a:t>A death is only counted if the character is killed on-screen. UNLESS, the character dies off-screen but the death is confirmed or assumed due to imminent death while on screen. The exception would be prominent off-screen deaths, and prominence is determined mostly by importance to the plot.</a:t>
-            </a:r>
-          </a:p>
-          <a:p>
-            <a:pPr marL="171450" indent="-171450">
-              <a:buFontTx/>
-              <a:buChar char="-"/>
-            </a:pPr>
-            <a:endParaRPr lang="en-US" sz="1050" dirty="0"/>
-          </a:p>
-          <a:p>
-            <a:pPr marL="171450" indent="-171450">
-              <a:buFontTx/>
-              <a:buChar char="-"/>
-            </a:pPr>
-            <a:r>
-              <a:rPr lang="en-US" sz="1050" dirty="0"/>
-              <a:t>Another decision that was made for this dataset was that if a character orders the death of another, the character who does the direct killing receives credit; not the one who orders the kill. But for cases where the direct killer is unidentifiable, like when Cersei Lannister uses the caches of wildfire to blow up the Great Sept of </a:t>
-            </a:r>
-            <a:r>
-              <a:rPr lang="en-US" sz="1050" dirty="0" err="1"/>
-              <a:t>Baelor</a:t>
-            </a:r>
-            <a:r>
-              <a:rPr lang="en-US" sz="1050" dirty="0"/>
-              <a:t>, the order giver receives the credit.</a:t>
-            </a:r>
-          </a:p>
-          <a:p>
-            <a:endParaRPr lang="en-US" sz="1050" dirty="0"/>
-          </a:p>
-          <a:p>
-            <a:r>
-              <a:rPr lang="en-US" sz="1050" dirty="0"/>
-              <a:t>It is also noted that f</a:t>
-            </a:r>
-            <a:r>
-              <a:rPr lang="en-US" sz="1050" b="0" i="0" dirty="0">
-                <a:effectLst/>
-                <a:latin typeface="-apple-system"/>
-              </a:rPr>
-              <a:t>or big battles such as the Battle of the Bastards, it is often unclear which side a </a:t>
-            </a:r>
-            <a:r>
-              <a:rPr lang="en-US" sz="1050" dirty="0">
-                <a:latin typeface="-apple-system"/>
-              </a:rPr>
-              <a:t>soldier being killed </a:t>
-            </a:r>
-            <a:r>
-              <a:rPr lang="en-US" sz="1050" b="0" i="0" dirty="0">
-                <a:effectLst/>
-                <a:latin typeface="-apple-system"/>
-              </a:rPr>
-              <a:t>belongs to. Educated guesses were made based on the details like the shape of a helmet a soldier is wearing, along with other things like sigils that can be seen on armor.</a:t>
-            </a:r>
+            <a:endParaRPr lang="en-US" dirty="0"/>
+          </a:p>
+          <a:p>
+            <a:endParaRPr lang="en-US" dirty="0"/>
+          </a:p>
+          <a:p>
+            <a:endParaRPr lang="en-US" dirty="0"/>
           </a:p>
         </p:txBody>
       </p:sp>
@@ -735,96 +744,6 @@
             <a:fld id="{8F5A56A7-EA17-4E80-9FDD-AF88C226E5E1}" type="slidenum">
               <a:rPr lang="en-US" smtClean="0"/>
               <a:t>2</a:t>
-            </a:fld>
-            <a:endParaRPr lang="en-US"/>
-          </a:p>
-        </p:txBody>
-      </p:sp>
-    </p:spTree>
-    <p:extLst>
-      <p:ext uri="{BB962C8B-B14F-4D97-AF65-F5344CB8AC3E}">
-        <p14:creationId xmlns:p14="http://schemas.microsoft.com/office/powerpoint/2010/main" val="2639276980"/>
-      </p:ext>
-    </p:extLst>
-  </p:cSld>
-  <p:clrMapOvr>
-    <a:masterClrMapping/>
-  </p:clrMapOvr>
-</p:notes>
-</file>
-
-<file path=ppt/notesSlides/notesSlide3.xml><?xml version="1.0" encoding="utf-8"?>
-<p:notes xmlns:a="http://schemas.openxmlformats.org/drawingml/2006/main" xmlns:r="http://schemas.openxmlformats.org/officeDocument/2006/relationships" xmlns:p="http://schemas.openxmlformats.org/presentationml/2006/main">
-  <p:cSld>
-    <p:spTree>
-      <p:nvGrpSpPr>
-        <p:cNvPr id="1" name=""/>
-        <p:cNvGrpSpPr/>
-        <p:nvPr/>
-      </p:nvGrpSpPr>
-      <p:grpSpPr>
-        <a:xfrm>
-          <a:off x="0" y="0"/>
-          <a:ext cx="0" cy="0"/>
-          <a:chOff x="0" y="0"/>
-          <a:chExt cx="0" cy="0"/>
-        </a:xfrm>
-      </p:grpSpPr>
-      <p:sp>
-        <p:nvSpPr>
-          <p:cNvPr id="2" name="Slide Image Placeholder 1"/>
-          <p:cNvSpPr>
-            <a:spLocks noGrp="1" noRot="1" noChangeAspect="1"/>
-          </p:cNvSpPr>
-          <p:nvPr>
-            <p:ph type="sldImg"/>
-          </p:nvPr>
-        </p:nvSpPr>
-        <p:spPr/>
-      </p:sp>
-      <p:sp>
-        <p:nvSpPr>
-          <p:cNvPr id="3" name="Notes Placeholder 2"/>
-          <p:cNvSpPr>
-            <a:spLocks noGrp="1"/>
-          </p:cNvSpPr>
-          <p:nvPr>
-            <p:ph type="body" idx="1"/>
-          </p:nvPr>
-        </p:nvSpPr>
-        <p:spPr/>
-        <p:txBody>
-          <a:bodyPr/>
-          <a:lstStyle/>
-          <a:p>
-            <a:endParaRPr lang="en-US" dirty="0"/>
-          </a:p>
-          <a:p>
-            <a:endParaRPr lang="en-US" dirty="0"/>
-          </a:p>
-          <a:p>
-            <a:endParaRPr lang="en-US" dirty="0"/>
-          </a:p>
-        </p:txBody>
-      </p:sp>
-      <p:sp>
-        <p:nvSpPr>
-          <p:cNvPr id="4" name="Slide Number Placeholder 3"/>
-          <p:cNvSpPr>
-            <a:spLocks noGrp="1"/>
-          </p:cNvSpPr>
-          <p:nvPr>
-            <p:ph type="sldNum" sz="quarter" idx="5"/>
-          </p:nvPr>
-        </p:nvSpPr>
-        <p:spPr/>
-        <p:txBody>
-          <a:bodyPr/>
-          <a:lstStyle/>
-          <a:p>
-            <a:fld id="{8F5A56A7-EA17-4E80-9FDD-AF88C226E5E1}" type="slidenum">
-              <a:rPr lang="en-US" smtClean="0"/>
-              <a:t>3</a:t>
             </a:fld>
             <a:endParaRPr lang="en-US"/>
           </a:p>
@@ -1015,6 +934,121 @@
 </p:notes>
 </file>
 
+<file path=ppt/notesSlides/notesSlide3.xml><?xml version="1.0" encoding="utf-8"?>
+<p:notes xmlns:a="http://schemas.openxmlformats.org/drawingml/2006/main" xmlns:r="http://schemas.openxmlformats.org/officeDocument/2006/relationships" xmlns:p="http://schemas.openxmlformats.org/presentationml/2006/main">
+  <p:cSld>
+    <p:spTree>
+      <p:nvGrpSpPr>
+        <p:cNvPr id="1" name=""/>
+        <p:cNvGrpSpPr/>
+        <p:nvPr/>
+      </p:nvGrpSpPr>
+      <p:grpSpPr>
+        <a:xfrm>
+          <a:off x="0" y="0"/>
+          <a:ext cx="0" cy="0"/>
+          <a:chOff x="0" y="0"/>
+          <a:chExt cx="0" cy="0"/>
+        </a:xfrm>
+      </p:grpSpPr>
+      <p:sp>
+        <p:nvSpPr>
+          <p:cNvPr id="2" name="Slide Image Placeholder 1"/>
+          <p:cNvSpPr>
+            <a:spLocks noGrp="1" noRot="1" noChangeAspect="1"/>
+          </p:cNvSpPr>
+          <p:nvPr>
+            <p:ph type="sldImg"/>
+          </p:nvPr>
+        </p:nvSpPr>
+        <p:spPr/>
+      </p:sp>
+      <p:sp>
+        <p:nvSpPr>
+          <p:cNvPr id="3" name="Notes Placeholder 2"/>
+          <p:cNvSpPr>
+            <a:spLocks noGrp="1"/>
+          </p:cNvSpPr>
+          <p:nvPr>
+            <p:ph type="body" idx="1"/>
+          </p:nvPr>
+        </p:nvSpPr>
+        <p:spPr/>
+        <p:txBody>
+          <a:bodyPr/>
+          <a:lstStyle/>
+          <a:p>
+            <a:r>
+              <a:rPr lang="en-US" dirty="0"/>
+              <a:t>Fun facts: </a:t>
+            </a:r>
+          </a:p>
+          <a:p>
+            <a:pPr marL="171450" indent="-171450">
+              <a:buFontTx/>
+              <a:buChar char="-"/>
+            </a:pPr>
+            <a:r>
+              <a:rPr lang="en-US" dirty="0"/>
+              <a:t>The very first death in Game of Thrones was Beyond the Wall, in the very first episode. </a:t>
+            </a:r>
+            <a:r>
+              <a:rPr lang="en-US" dirty="0" err="1"/>
+              <a:t>Waymar</a:t>
+            </a:r>
+            <a:r>
+              <a:rPr lang="en-US" dirty="0"/>
+              <a:t> Royce, a Ranger with The Night’s Watch, was killed by a White Walker.</a:t>
+            </a:r>
+          </a:p>
+          <a:p>
+            <a:pPr marL="171450" indent="-171450">
+              <a:buFontTx/>
+              <a:buChar char="-"/>
+            </a:pPr>
+            <a:r>
+              <a:rPr lang="en-US" dirty="0"/>
+              <a:t>Most death Beyond the Wall was not at the hands of anyone. For example, of the 917 Wights that died Beyond the Wall 421 of them drowned.</a:t>
+            </a:r>
+          </a:p>
+        </p:txBody>
+      </p:sp>
+      <p:sp>
+        <p:nvSpPr>
+          <p:cNvPr id="4" name="Slide Number Placeholder 3"/>
+          <p:cNvSpPr>
+            <a:spLocks noGrp="1"/>
+          </p:cNvSpPr>
+          <p:nvPr>
+            <p:ph type="sldNum" sz="quarter" idx="5"/>
+          </p:nvPr>
+        </p:nvSpPr>
+        <p:spPr/>
+        <p:txBody>
+          <a:bodyPr/>
+          <a:lstStyle/>
+          <a:p>
+            <a:fld id="{8F5A56A7-EA17-4E80-9FDD-AF88C226E5E1}" type="slidenum">
+              <a:rPr lang="en-US" smtClean="0"/>
+              <a:t>3</a:t>
+            </a:fld>
+            <a:endParaRPr lang="en-US"/>
+          </a:p>
+        </p:txBody>
+      </p:sp>
+    </p:spTree>
+    <p:extLst>
+      <p:ext uri="{BB962C8B-B14F-4D97-AF65-F5344CB8AC3E}">
+        <p14:creationId xmlns:p14="http://schemas.microsoft.com/office/powerpoint/2010/main" val="518783702"/>
+      </p:ext>
+    </p:extLst>
+  </p:cSld>
+  <p:clrMapOvr>
+    <a:masterClrMapping/>
+  </p:clrMapOvr>
+</p:notes>
+</file>
+
 <file path=ppt/notesSlides/notesSlide4.xml><?xml version="1.0" encoding="utf-8"?>
 <p:notes xmlns:a="http://schemas.openxmlformats.org/drawingml/2006/main" xmlns:r="http://schemas.openxmlformats.org/officeDocument/2006/relationships" xmlns:p="http://schemas.openxmlformats.org/presentationml/2006/main">
   <p:cSld>
@@ -1059,38 +1093,10 @@
           <a:bodyPr/>
           <a:lstStyle/>
           <a:p>
-            <a:r>
-              <a:rPr lang="en-US" dirty="0"/>
-              <a:t>Fun facts: </a:t>
-            </a:r>
-          </a:p>
-          <a:p>
-            <a:pPr marL="171450" indent="-171450">
-              <a:buFontTx/>
-              <a:buChar char="-"/>
-            </a:pPr>
-            <a:r>
-              <a:rPr lang="en-US" dirty="0"/>
-              <a:t>The very first death in Game of Thrones was Beyond the Wall, in the very first episode. </a:t>
-            </a:r>
-            <a:r>
-              <a:rPr lang="en-US" dirty="0" err="1"/>
-              <a:t>Waymar</a:t>
-            </a:r>
-            <a:r>
-              <a:rPr lang="en-US" dirty="0"/>
-              <a:t> Royce, a Ranger with The Night’s Watch, was killed by a White Walker.</a:t>
-            </a:r>
-          </a:p>
-          <a:p>
-            <a:pPr marL="171450" indent="-171450">
-              <a:buFontTx/>
-              <a:buChar char="-"/>
-            </a:pPr>
-            <a:r>
-              <a:rPr lang="en-US" dirty="0"/>
-              <a:t>Most death Beyond the Wall was not at the hands of anyone. For example, of the 917 Wights that died Beyond the Wall 421 of them drowned.</a:t>
-            </a:r>
+            <a:endParaRPr lang="en-US" dirty="0"/>
+          </a:p>
+          <a:p>
+            <a:endParaRPr lang="en-US" dirty="0"/>
           </a:p>
         </p:txBody>
       </p:sp>
@@ -1112,93 +1118,6 @@
             <a:fld id="{8F5A56A7-EA17-4E80-9FDD-AF88C226E5E1}" type="slidenum">
               <a:rPr lang="en-US" smtClean="0"/>
               <a:t>4</a:t>
-            </a:fld>
-            <a:endParaRPr lang="en-US"/>
-          </a:p>
-        </p:txBody>
-      </p:sp>
-    </p:spTree>
-    <p:extLst>
-      <p:ext uri="{BB962C8B-B14F-4D97-AF65-F5344CB8AC3E}">
-        <p14:creationId xmlns:p14="http://schemas.microsoft.com/office/powerpoint/2010/main" val="518783702"/>
-      </p:ext>
-    </p:extLst>
-  </p:cSld>
-  <p:clrMapOvr>
-    <a:masterClrMapping/>
-  </p:clrMapOvr>
-</p:notes>
-</file>
-
-<file path=ppt/notesSlides/notesSlide5.xml><?xml version="1.0" encoding="utf-8"?>
-<p:notes xmlns:a="http://schemas.openxmlformats.org/drawingml/2006/main" xmlns:r="http://schemas.openxmlformats.org/officeDocument/2006/relationships" xmlns:p="http://schemas.openxmlformats.org/presentationml/2006/main">
-  <p:cSld>
-    <p:spTree>
-      <p:nvGrpSpPr>
-        <p:cNvPr id="1" name=""/>
-        <p:cNvGrpSpPr/>
-        <p:nvPr/>
-      </p:nvGrpSpPr>
-      <p:grpSpPr>
-        <a:xfrm>
-          <a:off x="0" y="0"/>
-          <a:ext cx="0" cy="0"/>
-          <a:chOff x="0" y="0"/>
-          <a:chExt cx="0" cy="0"/>
-        </a:xfrm>
-      </p:grpSpPr>
-      <p:sp>
-        <p:nvSpPr>
-          <p:cNvPr id="2" name="Slide Image Placeholder 1"/>
-          <p:cNvSpPr>
-            <a:spLocks noGrp="1" noRot="1" noChangeAspect="1"/>
-          </p:cNvSpPr>
-          <p:nvPr>
-            <p:ph type="sldImg"/>
-          </p:nvPr>
-        </p:nvSpPr>
-        <p:spPr/>
-      </p:sp>
-      <p:sp>
-        <p:nvSpPr>
-          <p:cNvPr id="3" name="Notes Placeholder 2"/>
-          <p:cNvSpPr>
-            <a:spLocks noGrp="1"/>
-          </p:cNvSpPr>
-          <p:nvPr>
-            <p:ph type="body" idx="1"/>
-          </p:nvPr>
-        </p:nvSpPr>
-        <p:spPr/>
-        <p:txBody>
-          <a:bodyPr/>
-          <a:lstStyle/>
-          <a:p>
-            <a:endParaRPr lang="en-US" dirty="0"/>
-          </a:p>
-          <a:p>
-            <a:endParaRPr lang="en-US" dirty="0"/>
-          </a:p>
-        </p:txBody>
-      </p:sp>
-      <p:sp>
-        <p:nvSpPr>
-          <p:cNvPr id="4" name="Slide Number Placeholder 3"/>
-          <p:cNvSpPr>
-            <a:spLocks noGrp="1"/>
-          </p:cNvSpPr>
-          <p:nvPr>
-            <p:ph type="sldNum" sz="quarter" idx="5"/>
-          </p:nvPr>
-        </p:nvSpPr>
-        <p:spPr/>
-        <p:txBody>
-          <a:bodyPr/>
-          <a:lstStyle/>
-          <a:p>
-            <a:fld id="{8F5A56A7-EA17-4E80-9FDD-AF88C226E5E1}" type="slidenum">
-              <a:rPr lang="en-US" smtClean="0"/>
-              <a:t>5</a:t>
             </a:fld>
             <a:endParaRPr lang="en-US"/>
           </a:p>
@@ -1366,6 +1285,178 @@
 </p:notes>
 </file>
 
+<file path=ppt/notesSlides/notesSlide5.xml><?xml version="1.0" encoding="utf-8"?>
+<p:notes xmlns:a="http://schemas.openxmlformats.org/drawingml/2006/main" xmlns:r="http://schemas.openxmlformats.org/officeDocument/2006/relationships" xmlns:p="http://schemas.openxmlformats.org/presentationml/2006/main">
+  <p:cSld>
+    <p:spTree>
+      <p:nvGrpSpPr>
+        <p:cNvPr id="1" name=""/>
+        <p:cNvGrpSpPr/>
+        <p:nvPr/>
+      </p:nvGrpSpPr>
+      <p:grpSpPr>
+        <a:xfrm>
+          <a:off x="0" y="0"/>
+          <a:ext cx="0" cy="0"/>
+          <a:chOff x="0" y="0"/>
+          <a:chExt cx="0" cy="0"/>
+        </a:xfrm>
+      </p:grpSpPr>
+      <p:sp>
+        <p:nvSpPr>
+          <p:cNvPr id="2" name="Slide Image Placeholder 1"/>
+          <p:cNvSpPr>
+            <a:spLocks noGrp="1" noRot="1" noChangeAspect="1"/>
+          </p:cNvSpPr>
+          <p:nvPr>
+            <p:ph type="sldImg"/>
+          </p:nvPr>
+        </p:nvSpPr>
+        <p:spPr/>
+      </p:sp>
+      <p:sp>
+        <p:nvSpPr>
+          <p:cNvPr id="3" name="Notes Placeholder 2"/>
+          <p:cNvSpPr>
+            <a:spLocks noGrp="1"/>
+          </p:cNvSpPr>
+          <p:nvPr>
+            <p:ph type="body" idx="1"/>
+          </p:nvPr>
+        </p:nvSpPr>
+        <p:spPr/>
+        <p:txBody>
+          <a:bodyPr/>
+          <a:lstStyle/>
+          <a:p>
+            <a:r>
+              <a:rPr lang="en-US" dirty="0"/>
+              <a:t>Fun Facts:</a:t>
+            </a:r>
+          </a:p>
+          <a:p>
+            <a:pPr marL="171450" indent="-171450">
+              <a:buFontTx/>
+              <a:buChar char="-"/>
+            </a:pPr>
+            <a:r>
+              <a:rPr lang="en-US" dirty="0"/>
+              <a:t>King’s Landing is the home of the most amount of deaths of characters who were categorized as most important to the series (16): </a:t>
+            </a:r>
+          </a:p>
+          <a:p>
+            <a:pPr marL="628650" lvl="1" indent="-171450">
+              <a:buFontTx/>
+              <a:buChar char="-"/>
+            </a:pPr>
+            <a:r>
+              <a:rPr lang="en-US" dirty="0"/>
+              <a:t>Robert Baratheon, </a:t>
+            </a:r>
+            <a:r>
+              <a:rPr lang="en-US" u="sng" dirty="0"/>
+              <a:t>Ned Stark</a:t>
+            </a:r>
+            <a:r>
+              <a:rPr lang="en-US" dirty="0"/>
+              <a:t>, Joffrey Baratheon, </a:t>
+            </a:r>
+            <a:r>
+              <a:rPr lang="en-US" dirty="0" err="1"/>
+              <a:t>Oberyn</a:t>
+            </a:r>
+            <a:r>
+              <a:rPr lang="en-US" dirty="0"/>
+              <a:t> Martell, Shae, Tywin Lannister, High Sparrow, </a:t>
+            </a:r>
+            <a:r>
+              <a:rPr lang="en-US" dirty="0" err="1"/>
+              <a:t>Loras</a:t>
+            </a:r>
+            <a:r>
+              <a:rPr lang="en-US" dirty="0"/>
+              <a:t> Tyrell, </a:t>
+            </a:r>
+            <a:r>
+              <a:rPr lang="en-US" u="sng" dirty="0"/>
+              <a:t>Margaery Tyrell</a:t>
+            </a:r>
+            <a:r>
+              <a:rPr lang="en-US" dirty="0"/>
+              <a:t>, Tommen Baratheon, </a:t>
+            </a:r>
+            <a:r>
+              <a:rPr lang="en-US" dirty="0" err="1"/>
+              <a:t>Missandei</a:t>
+            </a:r>
+            <a:r>
+              <a:rPr lang="en-US" dirty="0"/>
+              <a:t>, </a:t>
+            </a:r>
+            <a:r>
+              <a:rPr lang="en-US" dirty="0" err="1"/>
+              <a:t>Euron</a:t>
+            </a:r>
+            <a:r>
+              <a:rPr lang="en-US" dirty="0"/>
+              <a:t> Greyjoy, Sandor “The Hound” Clegane, </a:t>
+            </a:r>
+            <a:r>
+              <a:rPr lang="en-US" u="sng" dirty="0"/>
+              <a:t>Jaime Lannister, Cersei Lannister</a:t>
+            </a:r>
+            <a:r>
+              <a:rPr lang="en-US" dirty="0"/>
+              <a:t>, and Daenerys Targaryen </a:t>
+            </a:r>
+          </a:p>
+          <a:p>
+            <a:r>
+              <a:rPr lang="en-US" dirty="0"/>
+              <a:t>- King’s Landing is the location of the very last death in the series</a:t>
+            </a:r>
+          </a:p>
+          <a:p>
+            <a:endParaRPr lang="en-US" dirty="0"/>
+          </a:p>
+        </p:txBody>
+      </p:sp>
+      <p:sp>
+        <p:nvSpPr>
+          <p:cNvPr id="4" name="Slide Number Placeholder 3"/>
+          <p:cNvSpPr>
+            <a:spLocks noGrp="1"/>
+          </p:cNvSpPr>
+          <p:nvPr>
+            <p:ph type="sldNum" sz="quarter" idx="5"/>
+          </p:nvPr>
+        </p:nvSpPr>
+        <p:spPr/>
+        <p:txBody>
+          <a:bodyPr/>
+          <a:lstStyle/>
+          <a:p>
+            <a:fld id="{8F5A56A7-EA17-4E80-9FDD-AF88C226E5E1}" type="slidenum">
+              <a:rPr lang="en-US" smtClean="0"/>
+              <a:t>5</a:t>
+            </a:fld>
+            <a:endParaRPr lang="en-US"/>
+          </a:p>
+        </p:txBody>
+      </p:sp>
+    </p:spTree>
+    <p:extLst>
+      <p:ext uri="{BB962C8B-B14F-4D97-AF65-F5344CB8AC3E}">
+        <p14:creationId xmlns:p14="http://schemas.microsoft.com/office/powerpoint/2010/main" val="3224003630"/>
+      </p:ext>
+    </p:extLst>
+  </p:cSld>
+  <p:clrMapOvr>
+    <a:masterClrMapping/>
+  </p:clrMapOvr>
+</p:notes>
+</file>
+
 <file path=ppt/notesSlides/notesSlide6.xml><?xml version="1.0" encoding="utf-8"?>
 <p:notes xmlns:a="http://schemas.openxmlformats.org/drawingml/2006/main" xmlns:r="http://schemas.openxmlformats.org/officeDocument/2006/relationships" xmlns:p="http://schemas.openxmlformats.org/presentationml/2006/main">
   <p:cSld>
@@ -1412,93 +1503,19 @@
           <a:p>
             <a:r>
               <a:rPr lang="en-US" dirty="0"/>
-              <a:t>Fun Facts:</a:t>
-            </a:r>
-          </a:p>
-          <a:p>
-            <a:pPr marL="171450" indent="-171450">
-              <a:buFontTx/>
-              <a:buChar char="-"/>
-            </a:pPr>
+              <a:t>- </a:t>
+            </a:r>
+            <a:r>
+              <a:rPr lang="en-US" sz="1200" dirty="0"/>
+              <a:t>If we remove all death connected to the Night King’s slaying, Arya drops to #4 with only 24 kills</a:t>
+            </a:r>
+            <a:endParaRPr lang="en-US" dirty="0"/>
+          </a:p>
+          <a:p>
             <a:r>
               <a:rPr lang="en-US" dirty="0"/>
-              <a:t>King’s Landing is the home of the most amount of deaths of characters who were categorized as most important to the series (16): </a:t>
-            </a:r>
-          </a:p>
-          <a:p>
-            <a:pPr marL="628650" lvl="1" indent="-171450">
-              <a:buFontTx/>
-              <a:buChar char="-"/>
-            </a:pPr>
-            <a:r>
-              <a:rPr lang="en-US" dirty="0"/>
-              <a:t>Robert Baratheon, </a:t>
-            </a:r>
-            <a:r>
-              <a:rPr lang="en-US" u="sng" dirty="0"/>
-              <a:t>Ned Stark</a:t>
-            </a:r>
-            <a:r>
-              <a:rPr lang="en-US" dirty="0"/>
-              <a:t>, Joffrey Baratheon, </a:t>
-            </a:r>
-            <a:r>
-              <a:rPr lang="en-US" dirty="0" err="1"/>
-              <a:t>Oberyn</a:t>
-            </a:r>
-            <a:r>
-              <a:rPr lang="en-US" dirty="0"/>
-              <a:t> Martell, Shae, Tywin Lannister, High Sparrow, </a:t>
-            </a:r>
-            <a:r>
-              <a:rPr lang="en-US" dirty="0" err="1"/>
-              <a:t>Loras</a:t>
-            </a:r>
-            <a:r>
-              <a:rPr lang="en-US" dirty="0"/>
-              <a:t> Tyrell, </a:t>
-            </a:r>
-            <a:r>
-              <a:rPr lang="en-US" u="sng" dirty="0"/>
-              <a:t>Margaery Tyrell</a:t>
-            </a:r>
-            <a:r>
-              <a:rPr lang="en-US" dirty="0"/>
-              <a:t>, Tommen Baratheon, </a:t>
-            </a:r>
-            <a:r>
-              <a:rPr lang="en-US" dirty="0" err="1"/>
-              <a:t>Missandei</a:t>
-            </a:r>
-            <a:r>
-              <a:rPr lang="en-US" dirty="0"/>
-              <a:t>, </a:t>
-            </a:r>
-            <a:r>
-              <a:rPr lang="en-US" dirty="0" err="1"/>
-              <a:t>Euron</a:t>
-            </a:r>
-            <a:r>
-              <a:rPr lang="en-US" dirty="0"/>
-              <a:t> Greyjoy, Sandor “The Hound” Clegane, </a:t>
-            </a:r>
-            <a:r>
-              <a:rPr lang="en-US" u="sng" dirty="0"/>
-              <a:t>Jaime Lannister, Cersei Lannister</a:t>
-            </a:r>
-            <a:r>
-              <a:rPr lang="en-US" dirty="0"/>
-              <a:t>, and Daenerys Targaryen </a:t>
-            </a:r>
-          </a:p>
-          <a:p>
-            <a:r>
-              <a:rPr lang="en-US" dirty="0"/>
-              <a:t>- King’s Landing is the location of the very last death in the series</a:t>
-            </a:r>
-          </a:p>
-          <a:p>
-            <a:endParaRPr lang="en-US" dirty="0"/>
+              <a:t>- The Wights led by the Night King and White Walkers descended on Winterfell in search of Bran Stark to kill him. They were met by several forces to stand against them starting one of the largest battles of the show, hence the most kills in Winterfell</a:t>
+            </a:r>
           </a:p>
         </p:txBody>
       </p:sp>
@@ -1528,7 +1545,7 @@
     </p:spTree>
     <p:extLst>
       <p:ext uri="{BB962C8B-B14F-4D97-AF65-F5344CB8AC3E}">
-        <p14:creationId xmlns:p14="http://schemas.microsoft.com/office/powerpoint/2010/main" val="3224003630"/>
+        <p14:creationId xmlns:p14="http://schemas.microsoft.com/office/powerpoint/2010/main" val="1045728317"/>
       </p:ext>
     </p:extLst>
   </p:cSld>
@@ -1582,20 +1599,57 @@
           <a:bodyPr/>
           <a:lstStyle/>
           <a:p>
+            <a:pPr marL="171450" indent="-171450">
+              <a:buFontTx/>
+              <a:buChar char="-"/>
+            </a:pPr>
             <a:r>
               <a:rPr lang="en-US" dirty="0"/>
-              <a:t>- </a:t>
-            </a:r>
-            <a:r>
-              <a:rPr lang="en-US" sz="1200" dirty="0"/>
-              <a:t>If we remove all death connected to the Night King’s slaying, Arya drops to #4 with only 24 kills</a:t>
-            </a:r>
-            <a:endParaRPr lang="en-US" dirty="0"/>
-          </a:p>
-          <a:p>
+              <a:t>Winterfell is the home of the second most amount of deaths of characters who were categorized as most important to the series (10): </a:t>
+            </a:r>
+          </a:p>
+          <a:p>
+            <a:pPr marL="628650" lvl="1" indent="-171450">
+              <a:buFontTx/>
+              <a:buChar char="-"/>
+            </a:pPr>
             <a:r>
               <a:rPr lang="en-US" dirty="0"/>
-              <a:t>- The Wights led by the Night King and White Walkers descended on Winterfell in search of Bran Stark to kill him. They were met by several forces to stand against them starting one of the largest battles of the show, hence the most kills in Winterfell</a:t>
+              <a:t>Stannis Baratheon, </a:t>
+            </a:r>
+            <a:r>
+              <a:rPr lang="en-US" dirty="0" err="1"/>
+              <a:t>Roose</a:t>
+            </a:r>
+            <a:r>
+              <a:rPr lang="en-US" dirty="0"/>
+              <a:t> Bolton, </a:t>
+            </a:r>
+            <a:r>
+              <a:rPr lang="en-US" dirty="0" err="1"/>
+              <a:t>Rickon</a:t>
+            </a:r>
+            <a:r>
+              <a:rPr lang="en-US" dirty="0"/>
+              <a:t> Stark, Ramsay Bolton, Petyr Baelish, Theon Greyjoy, Night King, Viserion (Wight), Jorah Mormont, Melisandre “Red Woman” of </a:t>
+            </a:r>
+            <a:r>
+              <a:rPr lang="en-US" dirty="0" err="1"/>
+              <a:t>Asshai</a:t>
+            </a:r>
+            <a:r>
+              <a:rPr lang="en-US" dirty="0"/>
+              <a:t> </a:t>
+            </a:r>
+          </a:p>
+          <a:p>
+            <a:pPr marL="1085850" lvl="2" indent="-171450">
+              <a:buFontTx/>
+              <a:buChar char="-"/>
+            </a:pPr>
+            <a:r>
+              <a:rPr lang="en-US" dirty="0"/>
+              <a:t>Arya Stark is responsible for 3 of those 10 kills</a:t>
             </a:r>
           </a:p>
         </p:txBody>
@@ -1626,7 +1680,7 @@
     </p:spTree>
     <p:extLst>
       <p:ext uri="{BB962C8B-B14F-4D97-AF65-F5344CB8AC3E}">
-        <p14:creationId xmlns:p14="http://schemas.microsoft.com/office/powerpoint/2010/main" val="1045728317"/>
+        <p14:creationId xmlns:p14="http://schemas.microsoft.com/office/powerpoint/2010/main" val="1349018263"/>
       </p:ext>
     </p:extLst>
   </p:cSld>
@@ -1680,58 +1734,7 @@
           <a:bodyPr/>
           <a:lstStyle/>
           <a:p>
-            <a:pPr marL="171450" indent="-171450">
-              <a:buFontTx/>
-              <a:buChar char="-"/>
-            </a:pPr>
-            <a:r>
-              <a:rPr lang="en-US" dirty="0"/>
-              <a:t>Winterfell is the home of the second most amount of deaths of characters who were categorized as most important to the series (10): </a:t>
-            </a:r>
-          </a:p>
-          <a:p>
-            <a:pPr marL="628650" lvl="1" indent="-171450">
-              <a:buFontTx/>
-              <a:buChar char="-"/>
-            </a:pPr>
-            <a:r>
-              <a:rPr lang="en-US" dirty="0"/>
-              <a:t>Stannis Baratheon, </a:t>
-            </a:r>
-            <a:r>
-              <a:rPr lang="en-US" dirty="0" err="1"/>
-              <a:t>Roose</a:t>
-            </a:r>
-            <a:r>
-              <a:rPr lang="en-US" dirty="0"/>
-              <a:t> Bolton, </a:t>
-            </a:r>
-            <a:r>
-              <a:rPr lang="en-US" dirty="0" err="1"/>
-              <a:t>Rickon</a:t>
-            </a:r>
-            <a:r>
-              <a:rPr lang="en-US" dirty="0"/>
-              <a:t> Stark, Ramsay Bolton, Petyr Baelish, Theon Greyjoy, Night King, Viserion (Wight), Jorah Mormont, Melisandre “Red Woman” of </a:t>
-            </a:r>
-            <a:r>
-              <a:rPr lang="en-US" dirty="0" err="1"/>
-              <a:t>Asshai</a:t>
-            </a:r>
-            <a:r>
-              <a:rPr lang="en-US" dirty="0"/>
-              <a:t> </a:t>
-            </a:r>
-          </a:p>
-          <a:p>
-            <a:pPr marL="1085850" lvl="2" indent="-171450">
-              <a:buFontTx/>
-              <a:buChar char="-"/>
-            </a:pPr>
-            <a:r>
-              <a:rPr lang="en-US" dirty="0"/>
-              <a:t>Arya Stark is responsible for 3 of those 10 kills</a:t>
-            </a:r>
+            <a:endParaRPr lang="en-US"/>
           </a:p>
         </p:txBody>
       </p:sp>
@@ -1761,7 +1764,7 @@
     </p:spTree>
     <p:extLst>
       <p:ext uri="{BB962C8B-B14F-4D97-AF65-F5344CB8AC3E}">
-        <p14:creationId xmlns:p14="http://schemas.microsoft.com/office/powerpoint/2010/main" val="1349018263"/>
+        <p14:creationId xmlns:p14="http://schemas.microsoft.com/office/powerpoint/2010/main" val="1881831069"/>
       </p:ext>
     </p:extLst>
   </p:cSld>
@@ -1845,7 +1848,7 @@
     </p:spTree>
     <p:extLst>
       <p:ext uri="{BB962C8B-B14F-4D97-AF65-F5344CB8AC3E}">
-        <p14:creationId xmlns:p14="http://schemas.microsoft.com/office/powerpoint/2010/main" val="1881831069"/>
+        <p14:creationId xmlns:p14="http://schemas.microsoft.com/office/powerpoint/2010/main" val="3527115745"/>
       </p:ext>
     </p:extLst>
   </p:cSld>
@@ -1984,7 +1987,7 @@
           <a:p>
             <a:fld id="{A4AB77D3-A144-461B-96A4-2B24F57D934A}" type="datetimeFigureOut">
               <a:rPr lang="en-US" smtClean="0"/>
-              <a:t>11/13/2022</a:t>
+              <a:t>11/14/2022</a:t>
             </a:fld>
             <a:endParaRPr lang="en-US"/>
           </a:p>
@@ -2152,7 +2155,7 @@
           <a:p>
             <a:fld id="{A4AB77D3-A144-461B-96A4-2B24F57D934A}" type="datetimeFigureOut">
               <a:rPr lang="en-US" smtClean="0"/>
-              <a:t>11/13/2022</a:t>
+              <a:t>11/14/2022</a:t>
             </a:fld>
             <a:endParaRPr lang="en-US"/>
           </a:p>
@@ -2330,7 +2333,7 @@
           <a:p>
             <a:fld id="{A4AB77D3-A144-461B-96A4-2B24F57D934A}" type="datetimeFigureOut">
               <a:rPr lang="en-US" smtClean="0"/>
-              <a:t>11/13/2022</a:t>
+              <a:t>11/14/2022</a:t>
             </a:fld>
             <a:endParaRPr lang="en-US"/>
           </a:p>
@@ -2498,7 +2501,7 @@
           <a:p>
             <a:fld id="{A4AB77D3-A144-461B-96A4-2B24F57D934A}" type="datetimeFigureOut">
               <a:rPr lang="en-US" smtClean="0"/>
-              <a:t>11/13/2022</a:t>
+              <a:t>11/14/2022</a:t>
             </a:fld>
             <a:endParaRPr lang="en-US"/>
           </a:p>
@@ -2743,7 +2746,7 @@
           <a:p>
             <a:fld id="{A4AB77D3-A144-461B-96A4-2B24F57D934A}" type="datetimeFigureOut">
               <a:rPr lang="en-US" smtClean="0"/>
-              <a:t>11/13/2022</a:t>
+              <a:t>11/14/2022</a:t>
             </a:fld>
             <a:endParaRPr lang="en-US"/>
           </a:p>
@@ -2972,7 +2975,7 @@
           <a:p>
             <a:fld id="{A4AB77D3-A144-461B-96A4-2B24F57D934A}" type="datetimeFigureOut">
               <a:rPr lang="en-US" smtClean="0"/>
-              <a:t>11/13/2022</a:t>
+              <a:t>11/14/2022</a:t>
             </a:fld>
             <a:endParaRPr lang="en-US"/>
           </a:p>
@@ -3336,7 +3339,7 @@
           <a:p>
             <a:fld id="{A4AB77D3-A144-461B-96A4-2B24F57D934A}" type="datetimeFigureOut">
               <a:rPr lang="en-US" smtClean="0"/>
-              <a:t>11/13/2022</a:t>
+              <a:t>11/14/2022</a:t>
             </a:fld>
             <a:endParaRPr lang="en-US"/>
           </a:p>
@@ -3453,7 +3456,7 @@
           <a:p>
             <a:fld id="{A4AB77D3-A144-461B-96A4-2B24F57D934A}" type="datetimeFigureOut">
               <a:rPr lang="en-US" smtClean="0"/>
-              <a:t>11/13/2022</a:t>
+              <a:t>11/14/2022</a:t>
             </a:fld>
             <a:endParaRPr lang="en-US"/>
           </a:p>
@@ -3548,7 +3551,7 @@
           <a:p>
             <a:fld id="{A4AB77D3-A144-461B-96A4-2B24F57D934A}" type="datetimeFigureOut">
               <a:rPr lang="en-US" smtClean="0"/>
-              <a:t>11/13/2022</a:t>
+              <a:t>11/14/2022</a:t>
             </a:fld>
             <a:endParaRPr lang="en-US"/>
           </a:p>
@@ -3823,7 +3826,7 @@
           <a:p>
             <a:fld id="{A4AB77D3-A144-461B-96A4-2B24F57D934A}" type="datetimeFigureOut">
               <a:rPr lang="en-US" smtClean="0"/>
-              <a:t>11/13/2022</a:t>
+              <a:t>11/14/2022</a:t>
             </a:fld>
             <a:endParaRPr lang="en-US"/>
           </a:p>
@@ -4075,7 +4078,7 @@
           <a:p>
             <a:fld id="{A4AB77D3-A144-461B-96A4-2B24F57D934A}" type="datetimeFigureOut">
               <a:rPr lang="en-US" smtClean="0"/>
-              <a:t>11/13/2022</a:t>
+              <a:t>11/14/2022</a:t>
             </a:fld>
             <a:endParaRPr lang="en-US"/>
           </a:p>
@@ -4286,7 +4289,7 @@
           <a:p>
             <a:fld id="{A4AB77D3-A144-461B-96A4-2B24F57D934A}" type="datetimeFigureOut">
               <a:rPr lang="en-US" smtClean="0"/>
-              <a:t>11/13/2022</a:t>
+              <a:t>11/14/2022</a:t>
             </a:fld>
             <a:endParaRPr lang="en-US"/>
           </a:p>
@@ -4712,135 +4715,6 @@
             <a:spLocks noGrp="1"/>
           </p:cNvSpPr>
           <p:nvPr>
-            <p:ph type="ctrTitle"/>
-          </p:nvPr>
-        </p:nvSpPr>
-        <p:spPr/>
-        <p:txBody>
-          <a:bodyPr/>
-          <a:lstStyle/>
-          <a:p>
-            <a:r>
-              <a:rPr lang="en-US" dirty="0">
-                <a:solidFill>
-                  <a:schemeClr val="bg1"/>
-                </a:solidFill>
-                <a:latin typeface="Game of Thrones" panose="02000500000000000000" pitchFamily="2" charset="0"/>
-              </a:rPr>
-              <a:t>Data Throne</a:t>
-            </a:r>
-          </a:p>
-        </p:txBody>
-      </p:sp>
-      <p:sp>
-        <p:nvSpPr>
-          <p:cNvPr id="3" name="Subtitle 2"/>
-          <p:cNvSpPr>
-            <a:spLocks noGrp="1"/>
-          </p:cNvSpPr>
-          <p:nvPr>
-            <p:ph type="subTitle" idx="1"/>
-          </p:nvPr>
-        </p:nvSpPr>
-        <p:spPr/>
-        <p:txBody>
-          <a:bodyPr/>
-          <a:lstStyle/>
-          <a:p>
-            <a:r>
-              <a:rPr lang="en-US" dirty="0">
-                <a:solidFill>
-                  <a:schemeClr val="bg1"/>
-                </a:solidFill>
-              </a:rPr>
-              <a:t>Kayli Aguilera, Autumn Klepal, Uma </a:t>
-            </a:r>
-            <a:r>
-              <a:rPr lang="en-US" dirty="0" err="1">
-                <a:solidFill>
-                  <a:schemeClr val="bg1"/>
-                </a:solidFill>
-              </a:rPr>
-              <a:t>Ranganathan</a:t>
-            </a:r>
-            <a:r>
-              <a:rPr lang="en-US" dirty="0">
-                <a:solidFill>
-                  <a:schemeClr val="bg1"/>
-                </a:solidFill>
-              </a:rPr>
-              <a:t>, Roland Salazar, </a:t>
-            </a:r>
-            <a:r>
-              <a:rPr lang="en-US" dirty="0" err="1">
-                <a:solidFill>
-                  <a:schemeClr val="bg1"/>
-                </a:solidFill>
-              </a:rPr>
-              <a:t>Randie</a:t>
-            </a:r>
-            <a:r>
-              <a:rPr lang="en-US" dirty="0">
-                <a:solidFill>
-                  <a:schemeClr val="bg1"/>
-                </a:solidFill>
-              </a:rPr>
-              <a:t> Sinclair</a:t>
-            </a:r>
-          </a:p>
-        </p:txBody>
-      </p:sp>
-    </p:spTree>
-    <p:extLst>
-      <p:ext uri="{BB962C8B-B14F-4D97-AF65-F5344CB8AC3E}">
-        <p14:creationId xmlns:p14="http://schemas.microsoft.com/office/powerpoint/2010/main" val="2742046812"/>
-      </p:ext>
-    </p:extLst>
-  </p:cSld>
-  <p:clrMapOvr>
-    <a:masterClrMapping/>
-  </p:clrMapOvr>
-</p:sld>
-</file>
-
-<file path=ppt/slides/slide2.xml><?xml version="1.0" encoding="utf-8"?>
-<p:sld xmlns:a="http://schemas.openxmlformats.org/drawingml/2006/main" xmlns:r="http://schemas.openxmlformats.org/officeDocument/2006/relationships" xmlns:p="http://schemas.openxmlformats.org/presentationml/2006/main">
-  <p:cSld>
-    <p:bg>
-      <p:bgPr>
-        <a:blipFill dpi="0" rotWithShape="1">
-          <a:blip r:embed="rId3">
-            <a:lum/>
-          </a:blip>
-          <a:srcRect/>
-          <a:stretch>
-            <a:fillRect/>
-          </a:stretch>
-        </a:blipFill>
-        <a:effectLst/>
-      </p:bgPr>
-    </p:bg>
-    <p:spTree>
-      <p:nvGrpSpPr>
-        <p:cNvPr id="1" name=""/>
-        <p:cNvGrpSpPr/>
-        <p:nvPr/>
-      </p:nvGrpSpPr>
-      <p:grpSpPr>
-        <a:xfrm>
-          <a:off x="0" y="0"/>
-          <a:ext cx="0" cy="0"/>
-          <a:chOff x="0" y="0"/>
-          <a:chExt cx="0" cy="0"/>
-        </a:xfrm>
-      </p:grpSpPr>
-      <p:sp>
-        <p:nvSpPr>
-          <p:cNvPr id="2" name="Title 1"/>
-          <p:cNvSpPr>
-            <a:spLocks noGrp="1"/>
-          </p:cNvSpPr>
-          <p:nvPr>
             <p:ph type="title"/>
           </p:nvPr>
         </p:nvSpPr>
@@ -5010,13 +4884,13 @@
   <p:clrMapOvr>
     <a:masterClrMapping/>
   </p:clrMapOvr>
-  <mc:AlternateContent xmlns:mc="http://schemas.openxmlformats.org/markup-compatibility/2006">
-    <mc:Choice xmlns:p14="http://schemas.microsoft.com/office/powerpoint/2010/main" Requires="p14">
+  <mc:AlternateContent xmlns:mc="http://schemas.openxmlformats.org/markup-compatibility/2006" xmlns:p14="http://schemas.microsoft.com/office/powerpoint/2010/main">
+    <mc:Choice Requires="p14">
       <p:transition spd="slow" p14:dur="3400">
         <p14:reveal/>
       </p:transition>
     </mc:Choice>
-    <mc:Fallback>
+    <mc:Fallback xmlns="">
       <p:transition spd="slow">
         <p:fade/>
       </p:transition>
@@ -5025,7 +4899,7 @@
 </p:sld>
 </file>
 
-<file path=ppt/slides/slide3.xml><?xml version="1.0" encoding="utf-8"?>
+<file path=ppt/slides/slide2.xml><?xml version="1.0" encoding="utf-8"?>
 <p:sld xmlns:a="http://schemas.openxmlformats.org/drawingml/2006/main" xmlns:r="http://schemas.openxmlformats.org/officeDocument/2006/relationships" xmlns:p="http://schemas.openxmlformats.org/presentationml/2006/main">
   <p:cSld>
     <p:bg>
@@ -6418,13 +6292,13 @@
   <p:clrMapOvr>
     <a:masterClrMapping/>
   </p:clrMapOvr>
-  <mc:AlternateContent xmlns:mc="http://schemas.openxmlformats.org/markup-compatibility/2006">
-    <mc:Choice xmlns:p14="http://schemas.microsoft.com/office/powerpoint/2010/main" Requires="p14">
+  <mc:AlternateContent xmlns:mc="http://schemas.openxmlformats.org/markup-compatibility/2006" xmlns:p14="http://schemas.microsoft.com/office/powerpoint/2010/main">
+    <mc:Choice Requires="p14">
       <p:transition spd="slow" p14:dur="3400">
         <p14:reveal/>
       </p:transition>
     </mc:Choice>
-    <mc:Fallback>
+    <mc:Fallback xmlns="">
       <p:transition spd="slow">
         <p:fade/>
       </p:transition>
@@ -6992,7 +6866,7 @@
 </p:sld>
 </file>
 
-<file path=ppt/slides/slide4.xml><?xml version="1.0" encoding="utf-8"?>
+<file path=ppt/slides/slide3.xml><?xml version="1.0" encoding="utf-8"?>
 <p:sld xmlns:a="http://schemas.openxmlformats.org/drawingml/2006/main" xmlns:r="http://schemas.openxmlformats.org/officeDocument/2006/relationships" xmlns:p="http://schemas.openxmlformats.org/presentationml/2006/main">
   <p:cSld>
     <p:bg>
@@ -7701,13 +7575,13 @@
   <p:clrMapOvr>
     <a:masterClrMapping/>
   </p:clrMapOvr>
-  <mc:AlternateContent xmlns:mc="http://schemas.openxmlformats.org/markup-compatibility/2006">
-    <mc:Choice xmlns:p14="http://schemas.microsoft.com/office/powerpoint/2010/main" Requires="p14">
+  <mc:AlternateContent xmlns:mc="http://schemas.openxmlformats.org/markup-compatibility/2006" xmlns:p14="http://schemas.microsoft.com/office/powerpoint/2010/main">
+    <mc:Choice Requires="p14">
       <p:transition spd="slow" p14:dur="3400">
         <p14:reveal/>
       </p:transition>
     </mc:Choice>
-    <mc:Fallback>
+    <mc:Fallback xmlns="">
       <p:transition spd="slow">
         <p:fade/>
       </p:transition>
@@ -7998,7 +7872,7 @@
 </p:sld>
 </file>
 
-<file path=ppt/slides/slide5.xml><?xml version="1.0" encoding="utf-8"?>
+<file path=ppt/slides/slide4.xml><?xml version="1.0" encoding="utf-8"?>
 <p:sld xmlns:a="http://schemas.openxmlformats.org/drawingml/2006/main" xmlns:r="http://schemas.openxmlformats.org/officeDocument/2006/relationships" xmlns:p="http://schemas.openxmlformats.org/presentationml/2006/main">
   <p:cSld>
     <p:bg>
@@ -9358,13 +9232,13 @@
   <p:clrMapOvr>
     <a:masterClrMapping/>
   </p:clrMapOvr>
-  <mc:AlternateContent xmlns:mc="http://schemas.openxmlformats.org/markup-compatibility/2006">
-    <mc:Choice xmlns:p14="http://schemas.microsoft.com/office/powerpoint/2010/main" Requires="p14">
+  <mc:AlternateContent xmlns:mc="http://schemas.openxmlformats.org/markup-compatibility/2006" xmlns:p14="http://schemas.microsoft.com/office/powerpoint/2010/main">
+    <mc:Choice Requires="p14">
       <p:transition spd="slow" p14:dur="3400">
         <p14:reveal/>
       </p:transition>
     </mc:Choice>
-    <mc:Fallback>
+    <mc:Fallback xmlns="">
       <p:transition spd="slow">
         <p:fade/>
       </p:transition>
@@ -9914,7 +9788,7 @@
 </p:sld>
 </file>
 
-<file path=ppt/slides/slide6.xml><?xml version="1.0" encoding="utf-8"?>
+<file path=ppt/slides/slide5.xml><?xml version="1.0" encoding="utf-8"?>
 <p:sld xmlns:a="http://schemas.openxmlformats.org/drawingml/2006/main" xmlns:r="http://schemas.openxmlformats.org/officeDocument/2006/relationships" xmlns:p="http://schemas.openxmlformats.org/presentationml/2006/main">
   <p:cSld>
     <p:bg>
@@ -10658,13 +10532,13 @@
   <p:clrMapOvr>
     <a:masterClrMapping/>
   </p:clrMapOvr>
-  <mc:AlternateContent xmlns:mc="http://schemas.openxmlformats.org/markup-compatibility/2006">
-    <mc:Choice xmlns:p14="http://schemas.microsoft.com/office/powerpoint/2010/main" Requires="p14">
+  <mc:AlternateContent xmlns:mc="http://schemas.openxmlformats.org/markup-compatibility/2006" xmlns:p14="http://schemas.microsoft.com/office/powerpoint/2010/main">
+    <mc:Choice Requires="p14">
       <p:transition spd="slow" p14:dur="3400">
         <p14:reveal/>
       </p:transition>
     </mc:Choice>
-    <mc:Fallback>
+    <mc:Fallback xmlns="">
       <p:transition spd="slow">
         <p:fade/>
       </p:transition>
@@ -11077,7 +10951,7 @@
 </p:sld>
 </file>
 
-<file path=ppt/slides/slide7.xml><?xml version="1.0" encoding="utf-8"?>
+<file path=ppt/slides/slide6.xml><?xml version="1.0" encoding="utf-8"?>
 <p:sld xmlns:a="http://schemas.openxmlformats.org/drawingml/2006/main" xmlns:r="http://schemas.openxmlformats.org/officeDocument/2006/relationships" xmlns:p="http://schemas.openxmlformats.org/presentationml/2006/main">
   <p:cSld>
     <p:bg>
@@ -12584,13 +12458,13 @@
   <p:clrMapOvr>
     <a:masterClrMapping/>
   </p:clrMapOvr>
-  <mc:AlternateContent xmlns:mc="http://schemas.openxmlformats.org/markup-compatibility/2006">
-    <mc:Choice xmlns:p14="http://schemas.microsoft.com/office/powerpoint/2010/main" Requires="p14">
+  <mc:AlternateContent xmlns:mc="http://schemas.openxmlformats.org/markup-compatibility/2006" xmlns:p14="http://schemas.microsoft.com/office/powerpoint/2010/main">
+    <mc:Choice Requires="p14">
       <p:transition spd="slow" p14:dur="3400">
         <p14:reveal/>
       </p:transition>
     </mc:Choice>
-    <mc:Fallback>
+    <mc:Fallback xmlns="">
       <p:transition spd="slow">
         <p:fade/>
       </p:transition>
@@ -13176,7 +13050,7 @@
 </p:sld>
 </file>
 
-<file path=ppt/slides/slide8.xml><?xml version="1.0" encoding="utf-8"?>
+<file path=ppt/slides/slide7.xml><?xml version="1.0" encoding="utf-8"?>
 <p:sld xmlns:a="http://schemas.openxmlformats.org/drawingml/2006/main" xmlns:r="http://schemas.openxmlformats.org/officeDocument/2006/relationships" xmlns:p="http://schemas.openxmlformats.org/presentationml/2006/main">
   <p:cSld>
     <p:bg>
@@ -13909,13 +13783,13 @@
   <p:clrMapOvr>
     <a:masterClrMapping/>
   </p:clrMapOvr>
-  <mc:AlternateContent xmlns:mc="http://schemas.openxmlformats.org/markup-compatibility/2006">
-    <mc:Choice xmlns:p14="http://schemas.microsoft.com/office/powerpoint/2010/main" Requires="p14">
+  <mc:AlternateContent xmlns:mc="http://schemas.openxmlformats.org/markup-compatibility/2006" xmlns:p14="http://schemas.microsoft.com/office/powerpoint/2010/main">
+    <mc:Choice Requires="p14">
       <p:transition spd="slow" p14:dur="3400">
         <p14:reveal/>
       </p:transition>
     </mc:Choice>
-    <mc:Fallback>
+    <mc:Fallback xmlns="">
       <p:transition spd="slow">
         <p:fade/>
       </p:transition>
@@ -14267,7 +14141,7 @@
 </p:sld>
 </file>
 
-<file path=ppt/slides/slide9.xml><?xml version="1.0" encoding="utf-8"?>
+<file path=ppt/slides/slide8.xml><?xml version="1.0" encoding="utf-8"?>
 <p:sld xmlns:a="http://schemas.openxmlformats.org/drawingml/2006/main" xmlns:r="http://schemas.openxmlformats.org/officeDocument/2006/relationships" xmlns:p="http://schemas.openxmlformats.org/presentationml/2006/main">
   <p:cSld>
     <p:bg>
@@ -14603,13 +14477,13 @@
   <p:clrMapOvr>
     <a:masterClrMapping/>
   </p:clrMapOvr>
-  <mc:AlternateContent xmlns:mc="http://schemas.openxmlformats.org/markup-compatibility/2006">
-    <mc:Choice xmlns:p14="http://schemas.microsoft.com/office/powerpoint/2010/main" Requires="p14">
+  <mc:AlternateContent xmlns:mc="http://schemas.openxmlformats.org/markup-compatibility/2006" xmlns:p14="http://schemas.microsoft.com/office/powerpoint/2010/main">
+    <mc:Choice Requires="p14">
       <p:transition spd="slow" p14:dur="3400">
         <p14:reveal/>
       </p:transition>
     </mc:Choice>
-    <mc:Fallback>
+    <mc:Fallback xmlns="">
       <p:transition spd="slow">
         <p:fade/>
       </p:transition>
@@ -15010,6 +14884,168 @@
       <p:bldP spid="3" grpId="0" build="p" animBg="1"/>
     </p:bldLst>
   </p:timing>
+</p:sld>
+</file>
+
+<file path=ppt/slides/slide9.xml><?xml version="1.0" encoding="utf-8"?>
+<p:sld xmlns:a="http://schemas.openxmlformats.org/drawingml/2006/main" xmlns:r="http://schemas.openxmlformats.org/officeDocument/2006/relationships" xmlns:p="http://schemas.openxmlformats.org/presentationml/2006/main">
+  <p:cSld>
+    <p:bg>
+      <p:bgPr>
+        <a:blipFill dpi="0" rotWithShape="1">
+          <a:blip r:embed="rId3">
+            <a:lum/>
+          </a:blip>
+          <a:srcRect/>
+          <a:stretch>
+            <a:fillRect/>
+          </a:stretch>
+        </a:blipFill>
+        <a:effectLst/>
+      </p:bgPr>
+    </p:bg>
+    <p:spTree>
+      <p:nvGrpSpPr>
+        <p:cNvPr id="1" name=""/>
+        <p:cNvGrpSpPr/>
+        <p:nvPr/>
+      </p:nvGrpSpPr>
+      <p:grpSpPr>
+        <a:xfrm>
+          <a:off x="0" y="0"/>
+          <a:ext cx="0" cy="0"/>
+          <a:chOff x="0" y="0"/>
+          <a:chExt cx="0" cy="0"/>
+        </a:xfrm>
+      </p:grpSpPr>
+      <p:sp>
+        <p:nvSpPr>
+          <p:cNvPr id="7" name="Content Placeholder 2">
+            <a:extLst>
+              <a:ext uri="{FF2B5EF4-FFF2-40B4-BE49-F238E27FC236}">
+                <a16:creationId xmlns:a16="http://schemas.microsoft.com/office/drawing/2014/main" id="{B573A63D-76CE-F310-378A-980A055ED0F9}"/>
+              </a:ext>
+            </a:extLst>
+          </p:cNvPr>
+          <p:cNvSpPr>
+            <a:spLocks noGrp="1"/>
+          </p:cNvSpPr>
+          <p:nvPr>
+            <p:ph idx="1"/>
+          </p:nvPr>
+        </p:nvSpPr>
+        <p:spPr>
+          <a:xfrm>
+            <a:off x="3807606" y="914401"/>
+            <a:ext cx="4576786" cy="639097"/>
+          </a:xfrm>
+          <a:solidFill>
+            <a:schemeClr val="bg1">
+              <a:lumMod val="65000"/>
+              <a:alpha val="59000"/>
+            </a:schemeClr>
+          </a:solidFill>
+          <a:effectLst>
+            <a:softEdge rad="63500"/>
+          </a:effectLst>
+        </p:spPr>
+        <p:txBody>
+          <a:bodyPr>
+            <a:noAutofit/>
+          </a:bodyPr>
+          <a:lstStyle/>
+          <a:p>
+            <a:pPr marL="0" indent="0" algn="ctr">
+              <a:buNone/>
+            </a:pPr>
+            <a:r>
+              <a:rPr lang="en-US" sz="4000" dirty="0">
+                <a:latin typeface="Game of Thrones" panose="02000500000000000000" pitchFamily="2" charset="0"/>
+              </a:rPr>
+              <a:t>questions</a:t>
+            </a:r>
+            <a:r>
+              <a:rPr lang="en-US" sz="6600" dirty="0">
+                <a:latin typeface="French Script MT" panose="03020402040607040605" pitchFamily="66" charset="0"/>
+              </a:rPr>
+              <a:t>?</a:t>
+            </a:r>
+            <a:endParaRPr lang="en-US" sz="2400" dirty="0">
+              <a:latin typeface="French Script MT" panose="03020402040607040605" pitchFamily="66" charset="0"/>
+            </a:endParaRPr>
+          </a:p>
+        </p:txBody>
+      </p:sp>
+      <p:pic>
+        <p:nvPicPr>
+          <p:cNvPr id="1026" name="Picture 2" descr="Game of Thrones: The Daenerys Targaryen Succession Question | Den of Geek">
+            <a:extLst>
+              <a:ext uri="{FF2B5EF4-FFF2-40B4-BE49-F238E27FC236}">
+                <a16:creationId xmlns:a16="http://schemas.microsoft.com/office/drawing/2014/main" id="{579D0921-3597-AB90-1A0C-F3A45A34E4DE}"/>
+              </a:ext>
+            </a:extLst>
+          </p:cNvPr>
+          <p:cNvPicPr>
+            <a:picLocks noChangeAspect="1" noChangeArrowheads="1"/>
+          </p:cNvPicPr>
+          <p:nvPr/>
+        </p:nvPicPr>
+        <p:blipFill rotWithShape="1">
+          <a:blip r:embed="rId4" cstate="print">
+            <a:extLst>
+              <a:ext uri="{28A0092B-C50C-407E-A947-70E740481C1C}">
+                <a14:useLocalDpi xmlns:a14="http://schemas.microsoft.com/office/drawing/2010/main" val="0"/>
+              </a:ext>
+            </a:extLst>
+          </a:blip>
+          <a:srcRect l="6355" r="20165"/>
+          <a:stretch/>
+        </p:blipFill>
+        <p:spPr bwMode="auto">
+          <a:xfrm>
+            <a:off x="3807606" y="2005780"/>
+            <a:ext cx="4576786" cy="3829665"/>
+          </a:xfrm>
+          <a:prstGeom prst="rect">
+            <a:avLst/>
+          </a:prstGeom>
+          <a:noFill/>
+          <a:effectLst>
+            <a:softEdge rad="127000"/>
+          </a:effectLst>
+          <a:extLst>
+            <a:ext uri="{909E8E84-426E-40DD-AFC4-6F175D3DCCD1}">
+              <a14:hiddenFill xmlns:a14="http://schemas.microsoft.com/office/drawing/2010/main">
+                <a:solidFill>
+                  <a:srgbClr val="FFFFFF"/>
+                </a:solidFill>
+              </a14:hiddenFill>
+            </a:ext>
+          </a:extLst>
+        </p:spPr>
+      </p:pic>
+    </p:spTree>
+    <p:extLst>
+      <p:ext uri="{BB962C8B-B14F-4D97-AF65-F5344CB8AC3E}">
+        <p14:creationId xmlns:p14="http://schemas.microsoft.com/office/powerpoint/2010/main" val="4157821240"/>
+      </p:ext>
+    </p:extLst>
+  </p:cSld>
+  <p:clrMapOvr>
+    <a:masterClrMapping/>
+  </p:clrMapOvr>
+  <mc:AlternateContent xmlns:mc="http://schemas.openxmlformats.org/markup-compatibility/2006">
+    <mc:Choice xmlns:p14="http://schemas.microsoft.com/office/powerpoint/2010/main" Requires="p14">
+      <p:transition spd="slow" p14:dur="3400">
+        <p14:reveal/>
+      </p:transition>
+    </mc:Choice>
+    <mc:Fallback>
+      <p:transition spd="slow">
+        <p:fade/>
+      </p:transition>
+    </mc:Fallback>
+  </mc:AlternateContent>
 </p:sld>
 </file>
 

</xml_diff>